<commit_message>
added back end and images
</commit_message>
<xml_diff>
--- a/AMT_Images.pptx
+++ b/AMT_Images.pptx
@@ -6,7 +6,9 @@
   </p:sldMasterIdLst>
   <p:sldIdLst>
     <p:sldId id="256" r:id="rId2"/>
-    <p:sldId id="257" r:id="rId3"/>
+    <p:sldId id="258" r:id="rId3"/>
+    <p:sldId id="257" r:id="rId4"/>
+    <p:sldId id="259" r:id="rId5"/>
   </p:sldIdLst>
   <p:sldSz cx="9144000" cy="6858000" type="screen4x3"/>
   <p:notesSz cx="6858000" cy="9144000"/>
@@ -289,7 +291,7 @@
           <a:p>
             <a:fld id="{5AFCFC37-D217-6D47-A2DB-E79D70B0F320}" type="datetimeFigureOut">
               <a:rPr lang="en-US" smtClean="0"/>
-              <a:t>12/22/15</a:t>
+              <a:t>1/23/16</a:t>
             </a:fld>
             <a:endParaRPr lang="en-US"/>
           </a:p>
@@ -459,7 +461,7 @@
           <a:p>
             <a:fld id="{5AFCFC37-D217-6D47-A2DB-E79D70B0F320}" type="datetimeFigureOut">
               <a:rPr lang="en-US" smtClean="0"/>
-              <a:t>12/22/15</a:t>
+              <a:t>1/23/16</a:t>
             </a:fld>
             <a:endParaRPr lang="en-US"/>
           </a:p>
@@ -639,7 +641,7 @@
           <a:p>
             <a:fld id="{5AFCFC37-D217-6D47-A2DB-E79D70B0F320}" type="datetimeFigureOut">
               <a:rPr lang="en-US" smtClean="0"/>
-              <a:t>12/22/15</a:t>
+              <a:t>1/23/16</a:t>
             </a:fld>
             <a:endParaRPr lang="en-US"/>
           </a:p>
@@ -809,7 +811,7 @@
           <a:p>
             <a:fld id="{5AFCFC37-D217-6D47-A2DB-E79D70B0F320}" type="datetimeFigureOut">
               <a:rPr lang="en-US" smtClean="0"/>
-              <a:t>12/22/15</a:t>
+              <a:t>1/23/16</a:t>
             </a:fld>
             <a:endParaRPr lang="en-US"/>
           </a:p>
@@ -1055,7 +1057,7 @@
           <a:p>
             <a:fld id="{5AFCFC37-D217-6D47-A2DB-E79D70B0F320}" type="datetimeFigureOut">
               <a:rPr lang="en-US" smtClean="0"/>
-              <a:t>12/22/15</a:t>
+              <a:t>1/23/16</a:t>
             </a:fld>
             <a:endParaRPr lang="en-US"/>
           </a:p>
@@ -1343,7 +1345,7 @@
           <a:p>
             <a:fld id="{5AFCFC37-D217-6D47-A2DB-E79D70B0F320}" type="datetimeFigureOut">
               <a:rPr lang="en-US" smtClean="0"/>
-              <a:t>12/22/15</a:t>
+              <a:t>1/23/16</a:t>
             </a:fld>
             <a:endParaRPr lang="en-US"/>
           </a:p>
@@ -1765,7 +1767,7 @@
           <a:p>
             <a:fld id="{5AFCFC37-D217-6D47-A2DB-E79D70B0F320}" type="datetimeFigureOut">
               <a:rPr lang="en-US" smtClean="0"/>
-              <a:t>12/22/15</a:t>
+              <a:t>1/23/16</a:t>
             </a:fld>
             <a:endParaRPr lang="en-US"/>
           </a:p>
@@ -1883,7 +1885,7 @@
           <a:p>
             <a:fld id="{5AFCFC37-D217-6D47-A2DB-E79D70B0F320}" type="datetimeFigureOut">
               <a:rPr lang="en-US" smtClean="0"/>
-              <a:t>12/22/15</a:t>
+              <a:t>1/23/16</a:t>
             </a:fld>
             <a:endParaRPr lang="en-US"/>
           </a:p>
@@ -1978,7 +1980,7 @@
           <a:p>
             <a:fld id="{5AFCFC37-D217-6D47-A2DB-E79D70B0F320}" type="datetimeFigureOut">
               <a:rPr lang="en-US" smtClean="0"/>
-              <a:t>12/22/15</a:t>
+              <a:t>1/23/16</a:t>
             </a:fld>
             <a:endParaRPr lang="en-US"/>
           </a:p>
@@ -2255,7 +2257,7 @@
           <a:p>
             <a:fld id="{5AFCFC37-D217-6D47-A2DB-E79D70B0F320}" type="datetimeFigureOut">
               <a:rPr lang="en-US" smtClean="0"/>
-              <a:t>12/22/15</a:t>
+              <a:t>1/23/16</a:t>
             </a:fld>
             <a:endParaRPr lang="en-US"/>
           </a:p>
@@ -2508,7 +2510,7 @@
           <a:p>
             <a:fld id="{5AFCFC37-D217-6D47-A2DB-E79D70B0F320}" type="datetimeFigureOut">
               <a:rPr lang="en-US" smtClean="0"/>
-              <a:t>12/22/15</a:t>
+              <a:t>1/23/16</a:t>
             </a:fld>
             <a:endParaRPr lang="en-US"/>
           </a:p>
@@ -2721,7 +2723,7 @@
           <a:p>
             <a:fld id="{5AFCFC37-D217-6D47-A2DB-E79D70B0F320}" type="datetimeFigureOut">
               <a:rPr lang="en-US" smtClean="0"/>
-              <a:t>12/22/15</a:t>
+              <a:t>1/23/16</a:t>
             </a:fld>
             <a:endParaRPr lang="en-US"/>
           </a:p>
@@ -3272,6 +3274,136 @@
           <a:chExt cx="0" cy="0"/>
         </a:xfrm>
       </p:grpSpPr>
+      <p:pic>
+        <p:nvPicPr>
+          <p:cNvPr id="2" name="Picture 1"/>
+          <p:cNvPicPr>
+            <a:picLocks noChangeAspect="1"/>
+          </p:cNvPicPr>
+          <p:nvPr/>
+        </p:nvPicPr>
+        <p:blipFill>
+          <a:blip r:embed="rId2"/>
+          <a:stretch>
+            <a:fillRect/>
+          </a:stretch>
+        </p:blipFill>
+        <p:spPr>
+          <a:xfrm>
+            <a:off x="1549866" y="341241"/>
+            <a:ext cx="5910108" cy="5910108"/>
+          </a:xfrm>
+          <a:prstGeom prst="rect">
+            <a:avLst/>
+          </a:prstGeom>
+        </p:spPr>
+      </p:pic>
+      <p:sp>
+        <p:nvSpPr>
+          <p:cNvPr id="9" name="TextBox 8"/>
+          <p:cNvSpPr txBox="1"/>
+          <p:nvPr/>
+        </p:nvSpPr>
+        <p:spPr>
+          <a:xfrm>
+            <a:off x="6053504" y="2568770"/>
+            <a:ext cx="2643157" cy="584776"/>
+          </a:xfrm>
+          <a:prstGeom prst="rect">
+            <a:avLst/>
+          </a:prstGeom>
+          <a:noFill/>
+        </p:spPr>
+        <p:txBody>
+          <a:bodyPr wrap="square" rtlCol="0">
+            <a:spAutoFit/>
+          </a:bodyPr>
+          <a:lstStyle/>
+          <a:p>
+            <a:r>
+              <a:rPr lang="en-US" sz="3200" b="1" dirty="0" smtClean="0"/>
+              <a:t>Move</a:t>
+            </a:r>
+            <a:r>
+              <a:rPr lang="en-US" sz="3200" b="1" dirty="0" smtClean="0"/>
+              <a:t> </a:t>
+            </a:r>
+            <a:r>
+              <a:rPr lang="en-US" sz="3200" b="1" dirty="0" smtClean="0"/>
+              <a:t>Right</a:t>
+            </a:r>
+            <a:endParaRPr lang="en-US" sz="3200" b="1" dirty="0"/>
+          </a:p>
+        </p:txBody>
+      </p:sp>
+      <p:sp>
+        <p:nvSpPr>
+          <p:cNvPr id="10" name="TextBox 9"/>
+          <p:cNvSpPr txBox="1"/>
+          <p:nvPr/>
+        </p:nvSpPr>
+        <p:spPr>
+          <a:xfrm>
+            <a:off x="798675" y="2641226"/>
+            <a:ext cx="1998011" cy="584776"/>
+          </a:xfrm>
+          <a:prstGeom prst="rect">
+            <a:avLst/>
+          </a:prstGeom>
+          <a:noFill/>
+        </p:spPr>
+        <p:txBody>
+          <a:bodyPr wrap="square" rtlCol="0">
+            <a:spAutoFit/>
+          </a:bodyPr>
+          <a:lstStyle/>
+          <a:p>
+            <a:r>
+              <a:rPr lang="en-US" sz="3200" b="1" dirty="0" smtClean="0"/>
+              <a:t>Move</a:t>
+            </a:r>
+            <a:r>
+              <a:rPr lang="en-US" sz="3200" b="1" dirty="0" smtClean="0"/>
+              <a:t> </a:t>
+            </a:r>
+            <a:r>
+              <a:rPr lang="en-US" sz="3200" b="1" dirty="0" smtClean="0"/>
+              <a:t>Left</a:t>
+            </a:r>
+            <a:endParaRPr lang="en-US" sz="3200" b="1" dirty="0"/>
+          </a:p>
+        </p:txBody>
+      </p:sp>
+    </p:spTree>
+    <p:extLst>
+      <p:ext uri="{BB962C8B-B14F-4D97-AF65-F5344CB8AC3E}">
+        <p14:creationId xmlns:p14="http://schemas.microsoft.com/office/powerpoint/2010/main" val="3398930963"/>
+      </p:ext>
+    </p:extLst>
+  </p:cSld>
+  <p:clrMapOvr>
+    <a:masterClrMapping/>
+  </p:clrMapOvr>
+</p:sld>
+</file>
+
+<file path=ppt/slides/slide3.xml><?xml version="1.0" encoding="utf-8"?>
+<p:sld xmlns:a="http://schemas.openxmlformats.org/drawingml/2006/main" xmlns:r="http://schemas.openxmlformats.org/officeDocument/2006/relationships" xmlns:p="http://schemas.openxmlformats.org/presentationml/2006/main">
+  <p:cSld>
+    <p:spTree>
+      <p:nvGrpSpPr>
+        <p:cNvPr id="1" name=""/>
+        <p:cNvGrpSpPr/>
+        <p:nvPr/>
+      </p:nvGrpSpPr>
+      <p:grpSpPr>
+        <a:xfrm>
+          <a:off x="0" y="0"/>
+          <a:ext cx="0" cy="0"/>
+          <a:chOff x="0" y="0"/>
+          <a:chExt cx="0" cy="0"/>
+        </a:xfrm>
+      </p:grpSpPr>
       <p:sp>
         <p:nvSpPr>
           <p:cNvPr id="7" name="TextBox 6"/>
@@ -3280,7 +3412,7 @@
         </p:nvSpPr>
         <p:spPr>
           <a:xfrm>
-            <a:off x="1274957" y="3862577"/>
+            <a:off x="1474758" y="3862577"/>
             <a:ext cx="2828142" cy="584776"/>
           </a:xfrm>
           <a:prstGeom prst="rect">
@@ -3382,10 +3514,434 @@
           </a:prstGeom>
         </p:spPr>
       </p:pic>
+      <p:pic>
+        <p:nvPicPr>
+          <p:cNvPr id="6" name="Picture 5"/>
+          <p:cNvPicPr>
+            <a:picLocks noChangeAspect="1"/>
+          </p:cNvPicPr>
+          <p:nvPr/>
+        </p:nvPicPr>
+        <p:blipFill rotWithShape="1">
+          <a:blip r:embed="rId4"/>
+          <a:srcRect l="30869" t="16546" r="30607" b="49907"/>
+          <a:stretch/>
+        </p:blipFill>
+        <p:spPr>
+          <a:xfrm>
+            <a:off x="2089622" y="4558169"/>
+            <a:ext cx="1630964" cy="1420260"/>
+          </a:xfrm>
+          <a:prstGeom prst="rect">
+            <a:avLst/>
+          </a:prstGeom>
+        </p:spPr>
+      </p:pic>
+      <p:pic>
+        <p:nvPicPr>
+          <p:cNvPr id="10" name="Picture 9"/>
+          <p:cNvPicPr>
+            <a:picLocks noChangeAspect="1"/>
+          </p:cNvPicPr>
+          <p:nvPr/>
+        </p:nvPicPr>
+        <p:blipFill rotWithShape="1">
+          <a:blip r:embed="rId4"/>
+          <a:srcRect l="33570" t="49307" r="32623" b="17975"/>
+          <a:stretch/>
+        </p:blipFill>
+        <p:spPr>
+          <a:xfrm>
+            <a:off x="6161767" y="4558169"/>
+            <a:ext cx="1467494" cy="1420260"/>
+          </a:xfrm>
+          <a:prstGeom prst="rect">
+            <a:avLst/>
+          </a:prstGeom>
+        </p:spPr>
+      </p:pic>
     </p:spTree>
     <p:extLst>
       <p:ext uri="{BB962C8B-B14F-4D97-AF65-F5344CB8AC3E}">
         <p14:creationId xmlns:p14="http://schemas.microsoft.com/office/powerpoint/2010/main" val="2309314786"/>
+      </p:ext>
+    </p:extLst>
+  </p:cSld>
+  <p:clrMapOvr>
+    <a:masterClrMapping/>
+  </p:clrMapOvr>
+</p:sld>
+</file>
+
+<file path=ppt/slides/slide4.xml><?xml version="1.0" encoding="utf-8"?>
+<p:sld xmlns:a="http://schemas.openxmlformats.org/drawingml/2006/main" xmlns:r="http://schemas.openxmlformats.org/officeDocument/2006/relationships" xmlns:p="http://schemas.openxmlformats.org/presentationml/2006/main">
+  <p:cSld>
+    <p:spTree>
+      <p:nvGrpSpPr>
+        <p:cNvPr id="1" name=""/>
+        <p:cNvGrpSpPr/>
+        <p:nvPr/>
+      </p:nvGrpSpPr>
+      <p:grpSpPr>
+        <a:xfrm>
+          <a:off x="0" y="0"/>
+          <a:ext cx="0" cy="0"/>
+          <a:chOff x="0" y="0"/>
+          <a:chExt cx="0" cy="0"/>
+        </a:xfrm>
+      </p:grpSpPr>
+      <p:pic>
+        <p:nvPicPr>
+          <p:cNvPr id="4" name="Picture 3"/>
+          <p:cNvPicPr>
+            <a:picLocks noChangeAspect="1"/>
+          </p:cNvPicPr>
+          <p:nvPr/>
+        </p:nvPicPr>
+        <p:blipFill rotWithShape="1">
+          <a:blip r:embed="rId2"/>
+          <a:srcRect r="34560" b="33505"/>
+          <a:stretch/>
+        </p:blipFill>
+        <p:spPr>
+          <a:xfrm>
+            <a:off x="358780" y="1997477"/>
+            <a:ext cx="2084751" cy="1985984"/>
+          </a:xfrm>
+          <a:prstGeom prst="rect">
+            <a:avLst/>
+          </a:prstGeom>
+          <a:ln w="6350" cmpd="sng">
+            <a:solidFill>
+              <a:schemeClr val="tx1"/>
+            </a:solidFill>
+          </a:ln>
+        </p:spPr>
+      </p:pic>
+      <p:pic>
+        <p:nvPicPr>
+          <p:cNvPr id="5" name="Picture 4"/>
+          <p:cNvPicPr>
+            <a:picLocks noChangeAspect="1"/>
+          </p:cNvPicPr>
+          <p:nvPr/>
+        </p:nvPicPr>
+        <p:blipFill rotWithShape="1">
+          <a:blip r:embed="rId3"/>
+          <a:srcRect l="1" t="7164" r="28253" b="19932"/>
+          <a:stretch/>
+        </p:blipFill>
+        <p:spPr>
+          <a:xfrm>
+            <a:off x="6669631" y="1997478"/>
+            <a:ext cx="2084752" cy="1985983"/>
+          </a:xfrm>
+          <a:prstGeom prst="rect">
+            <a:avLst/>
+          </a:prstGeom>
+          <a:ln w="6350" cmpd="sng">
+            <a:solidFill>
+              <a:schemeClr val="tx1"/>
+            </a:solidFill>
+          </a:ln>
+        </p:spPr>
+      </p:pic>
+      <p:pic>
+        <p:nvPicPr>
+          <p:cNvPr id="6" name="Picture 5"/>
+          <p:cNvPicPr>
+            <a:picLocks noChangeAspect="1"/>
+          </p:cNvPicPr>
+          <p:nvPr/>
+        </p:nvPicPr>
+        <p:blipFill rotWithShape="1">
+          <a:blip r:embed="rId4"/>
+          <a:srcRect r="3730" b="12177"/>
+          <a:stretch/>
+        </p:blipFill>
+        <p:spPr>
+          <a:xfrm>
+            <a:off x="3367281" y="1997477"/>
+            <a:ext cx="2322175" cy="1985984"/>
+          </a:xfrm>
+          <a:prstGeom prst="rect">
+            <a:avLst/>
+          </a:prstGeom>
+          <a:ln w="6350" cmpd="sng">
+            <a:solidFill>
+              <a:schemeClr val="tx1"/>
+            </a:solidFill>
+          </a:ln>
+        </p:spPr>
+      </p:pic>
+      <p:sp>
+        <p:nvSpPr>
+          <p:cNvPr id="8" name="Curved Down Arrow 7"/>
+          <p:cNvSpPr/>
+          <p:nvPr/>
+        </p:nvSpPr>
+        <p:spPr>
+          <a:xfrm>
+            <a:off x="3867320" y="1997478"/>
+            <a:ext cx="1327588" cy="331020"/>
+          </a:xfrm>
+          <a:prstGeom prst="curvedDownArrow">
+            <a:avLst/>
+          </a:prstGeom>
+          <a:ln/>
+        </p:spPr>
+        <p:style>
+          <a:lnRef idx="1">
+            <a:schemeClr val="dk1"/>
+          </a:lnRef>
+          <a:fillRef idx="3">
+            <a:schemeClr val="dk1"/>
+          </a:fillRef>
+          <a:effectRef idx="2">
+            <a:schemeClr val="dk1"/>
+          </a:effectRef>
+          <a:fontRef idx="minor">
+            <a:schemeClr val="lt1"/>
+          </a:fontRef>
+        </p:style>
+        <p:txBody>
+          <a:bodyPr rtlCol="0" anchor="ctr"/>
+          <a:lstStyle/>
+          <a:p>
+            <a:pPr algn="ctr"/>
+            <a:endParaRPr lang="en-US">
+              <a:solidFill>
+                <a:schemeClr val="tx1"/>
+              </a:solidFill>
+            </a:endParaRPr>
+          </a:p>
+        </p:txBody>
+      </p:sp>
+      <p:sp>
+        <p:nvSpPr>
+          <p:cNvPr id="9" name="Curved Down Arrow 8"/>
+          <p:cNvSpPr/>
+          <p:nvPr/>
+        </p:nvSpPr>
+        <p:spPr>
+          <a:xfrm flipV="1">
+            <a:off x="3867320" y="3817951"/>
+            <a:ext cx="1327588" cy="331020"/>
+          </a:xfrm>
+          <a:prstGeom prst="curvedDownArrow">
+            <a:avLst/>
+          </a:prstGeom>
+          <a:ln/>
+        </p:spPr>
+        <p:style>
+          <a:lnRef idx="1">
+            <a:schemeClr val="dk1"/>
+          </a:lnRef>
+          <a:fillRef idx="3">
+            <a:schemeClr val="dk1"/>
+          </a:fillRef>
+          <a:effectRef idx="2">
+            <a:schemeClr val="dk1"/>
+          </a:effectRef>
+          <a:fontRef idx="minor">
+            <a:schemeClr val="lt1"/>
+          </a:fontRef>
+        </p:style>
+        <p:txBody>
+          <a:bodyPr rtlCol="0" anchor="ctr"/>
+          <a:lstStyle/>
+          <a:p>
+            <a:pPr algn="ctr"/>
+            <a:endParaRPr lang="en-US">
+              <a:solidFill>
+                <a:schemeClr val="tx1"/>
+              </a:solidFill>
+            </a:endParaRPr>
+          </a:p>
+        </p:txBody>
+      </p:sp>
+      <p:pic>
+        <p:nvPicPr>
+          <p:cNvPr id="12" name="Picture 11"/>
+          <p:cNvPicPr>
+            <a:picLocks noChangeAspect="1"/>
+          </p:cNvPicPr>
+          <p:nvPr/>
+        </p:nvPicPr>
+        <p:blipFill>
+          <a:blip r:embed="rId5"/>
+          <a:stretch>
+            <a:fillRect/>
+          </a:stretch>
+        </p:blipFill>
+        <p:spPr>
+          <a:xfrm>
+            <a:off x="1408530" y="2732617"/>
+            <a:ext cx="327144" cy="327144"/>
+          </a:xfrm>
+          <a:prstGeom prst="rect">
+            <a:avLst/>
+          </a:prstGeom>
+        </p:spPr>
+      </p:pic>
+      <p:cxnSp>
+        <p:nvCxnSpPr>
+          <p:cNvPr id="14" name="Straight Arrow Connector 13"/>
+          <p:cNvCxnSpPr/>
+          <p:nvPr/>
+        </p:nvCxnSpPr>
+        <p:spPr>
+          <a:xfrm flipV="1">
+            <a:off x="8388810" y="3059761"/>
+            <a:ext cx="142605" cy="758190"/>
+          </a:xfrm>
+          <a:prstGeom prst="straightConnector1">
+            <a:avLst/>
+          </a:prstGeom>
+          <a:ln w="38100" cmpd="sng">
+            <a:headEnd type="arrow"/>
+            <a:tailEnd type="arrow"/>
+          </a:ln>
+        </p:spPr>
+        <p:style>
+          <a:lnRef idx="2">
+            <a:schemeClr val="dk1"/>
+          </a:lnRef>
+          <a:fillRef idx="0">
+            <a:schemeClr val="dk1"/>
+          </a:fillRef>
+          <a:effectRef idx="1">
+            <a:schemeClr val="dk1"/>
+          </a:effectRef>
+          <a:fontRef idx="minor">
+            <a:schemeClr val="tx1"/>
+          </a:fontRef>
+        </p:style>
+      </p:cxnSp>
+      <p:sp>
+        <p:nvSpPr>
+          <p:cNvPr id="21" name="TextBox 20"/>
+          <p:cNvSpPr txBox="1"/>
+          <p:nvPr/>
+        </p:nvSpPr>
+        <p:spPr>
+          <a:xfrm>
+            <a:off x="8388810" y="2690429"/>
+            <a:ext cx="662070" cy="369332"/>
+          </a:xfrm>
+          <a:prstGeom prst="rect">
+            <a:avLst/>
+          </a:prstGeom>
+          <a:noFill/>
+        </p:spPr>
+        <p:txBody>
+          <a:bodyPr wrap="square" rtlCol="0">
+            <a:spAutoFit/>
+          </a:bodyPr>
+          <a:lstStyle/>
+          <a:p>
+            <a:r>
+              <a:rPr lang="en-US" b="1" dirty="0" smtClean="0"/>
+              <a:t>W</a:t>
+            </a:r>
+            <a:endParaRPr lang="en-US" b="1" dirty="0"/>
+          </a:p>
+        </p:txBody>
+      </p:sp>
+      <p:sp>
+        <p:nvSpPr>
+          <p:cNvPr id="22" name="TextBox 21"/>
+          <p:cNvSpPr txBox="1"/>
+          <p:nvPr/>
+        </p:nvSpPr>
+        <p:spPr>
+          <a:xfrm>
+            <a:off x="8223687" y="3697681"/>
+            <a:ext cx="662070" cy="369332"/>
+          </a:xfrm>
+          <a:prstGeom prst="rect">
+            <a:avLst/>
+          </a:prstGeom>
+          <a:noFill/>
+        </p:spPr>
+        <p:txBody>
+          <a:bodyPr wrap="square" rtlCol="0">
+            <a:spAutoFit/>
+          </a:bodyPr>
+          <a:lstStyle/>
+          <a:p>
+            <a:r>
+              <a:rPr lang="en-US" b="1" dirty="0" smtClean="0"/>
+              <a:t>S</a:t>
+            </a:r>
+            <a:endParaRPr lang="en-US" b="1" dirty="0"/>
+          </a:p>
+        </p:txBody>
+      </p:sp>
+      <p:sp>
+        <p:nvSpPr>
+          <p:cNvPr id="23" name="TextBox 22"/>
+          <p:cNvSpPr txBox="1"/>
+          <p:nvPr/>
+        </p:nvSpPr>
+        <p:spPr>
+          <a:xfrm>
+            <a:off x="4370698" y="1573845"/>
+            <a:ext cx="662070" cy="369332"/>
+          </a:xfrm>
+          <a:prstGeom prst="rect">
+            <a:avLst/>
+          </a:prstGeom>
+          <a:noFill/>
+        </p:spPr>
+        <p:txBody>
+          <a:bodyPr wrap="square" rtlCol="0">
+            <a:spAutoFit/>
+          </a:bodyPr>
+          <a:lstStyle/>
+          <a:p>
+            <a:r>
+              <a:rPr lang="en-US" b="1" dirty="0" smtClean="0"/>
+              <a:t>D</a:t>
+            </a:r>
+            <a:endParaRPr lang="en-US" b="1" dirty="0"/>
+          </a:p>
+        </p:txBody>
+      </p:sp>
+      <p:sp>
+        <p:nvSpPr>
+          <p:cNvPr id="24" name="TextBox 23"/>
+          <p:cNvSpPr txBox="1"/>
+          <p:nvPr/>
+        </p:nvSpPr>
+        <p:spPr>
+          <a:xfrm>
+            <a:off x="4370698" y="4179520"/>
+            <a:ext cx="662070" cy="369332"/>
+          </a:xfrm>
+          <a:prstGeom prst="rect">
+            <a:avLst/>
+          </a:prstGeom>
+          <a:noFill/>
+        </p:spPr>
+        <p:txBody>
+          <a:bodyPr wrap="square" rtlCol="0">
+            <a:spAutoFit/>
+          </a:bodyPr>
+          <a:lstStyle/>
+          <a:p>
+            <a:r>
+              <a:rPr lang="en-US" b="1" dirty="0" smtClean="0"/>
+              <a:t>A</a:t>
+            </a:r>
+            <a:endParaRPr lang="en-US" b="1" dirty="0"/>
+          </a:p>
+        </p:txBody>
+      </p:sp>
+    </p:spTree>
+    <p:extLst>
+      <p:ext uri="{BB962C8B-B14F-4D97-AF65-F5344CB8AC3E}">
+        <p14:creationId xmlns:p14="http://schemas.microsoft.com/office/powerpoint/2010/main" val="641057916"/>
       </p:ext>
     </p:extLst>
   </p:cSld>

</xml_diff>